<commit_message>
added Packaging and Transport Organization to the flow
</commit_message>
<xml_diff>
--- a/Documents/UseCase-diagram.pptx
+++ b/Documents/UseCase-diagram.pptx
@@ -7339,7 +7339,15 @@
                   <a:spcPct val="35000"/>
                 </a:spcAft>
               </a:pPr>
-              <a:endParaRPr lang="en-US" sz="800" kern="1200" dirty="0"/>
+              <a:r>
+                <a:rPr lang="en-US" sz="800" dirty="0">
+                  <a:latin typeface="Rockwell" panose="02060603020205020403" pitchFamily="18" charset="77"/>
+                </a:rPr>
+                <a:t>Grocery request is fulfilled</a:t>
+              </a:r>
+              <a:endParaRPr lang="en-US" sz="800" kern="1200" dirty="0">
+                <a:latin typeface="Rockwell" panose="02060603020205020403" pitchFamily="18" charset="77"/>
+              </a:endParaRPr>
             </a:p>
           </p:txBody>
         </p:sp>
@@ -7429,8 +7437,8 @@
           </p:nvSpPr>
           <p:spPr>
             <a:xfrm>
-              <a:off x="799136" y="291115"/>
-              <a:ext cx="1396149" cy="1396149"/>
+              <a:off x="827643" y="407704"/>
+              <a:ext cx="1396148" cy="1396149"/>
             </a:xfrm>
             <a:prstGeom prst="rect">
               <a:avLst/>
@@ -7467,7 +7475,12 @@
                   <a:spcPct val="35000"/>
                 </a:spcAft>
               </a:pPr>
-              <a:endParaRPr lang="en-US" sz="800" kern="1200" dirty="0"/>
+              <a:r>
+                <a:rPr lang="en-US" sz="800" kern="1200" dirty="0">
+                  <a:latin typeface="Rockwell" panose="02060603020205020403" pitchFamily="18" charset="77"/>
+                </a:rPr>
+                <a:t>Supplier will request for Groceries</a:t>
+              </a:r>
             </a:p>
           </p:txBody>
         </p:sp>
@@ -7713,7 +7726,7 @@
           <p:nvPr/>
         </p:nvSpPr>
         <p:spPr>
-          <a:xfrm rot="16600670">
+          <a:xfrm rot="5700185">
             <a:off x="10162085" y="3699272"/>
             <a:ext cx="610567" cy="196089"/>
           </a:xfrm>
@@ -7771,7 +7784,7 @@
         </p:nvSpPr>
         <p:spPr>
           <a:xfrm rot="14195409">
-            <a:off x="10519911" y="3284599"/>
+            <a:off x="10380330" y="3318466"/>
             <a:ext cx="1473664" cy="259339"/>
           </a:xfrm>
           <a:prstGeom prst="rightArrow">
@@ -7884,7 +7897,7 @@
           <p:nvPr/>
         </p:nvSpPr>
         <p:spPr>
-          <a:xfrm rot="14392697">
+          <a:xfrm rot="4146099">
             <a:off x="10210753" y="5161873"/>
             <a:ext cx="746966" cy="254346"/>
           </a:xfrm>

</xml_diff>

<commit_message>
UI fixes, use cae diagram, final commit
</commit_message>
<xml_diff>
--- a/Documents/UseCase-diagram.pptx
+++ b/Documents/UseCase-diagram.pptx
@@ -107,6 +107,11 @@
       </a:defRPr>
     </a:lvl9pPr>
   </p:defaultTextStyle>
+  <p:extLst>
+    <p:ext uri="{EFAFB233-063F-42B5-8137-9DF3F51BA10A}">
+      <p15:sldGuideLst xmlns:p15="http://schemas.microsoft.com/office/powerpoint/2012/main"/>
+    </p:ext>
+  </p:extLst>
 </p:presentation>
 </file>
 
@@ -192,7 +197,7 @@
           <a:p>
             <a:fld id="{E31A668F-6E79-0F45-88F0-7D4E3C95C78F}" type="datetimeFigureOut">
               <a:rPr lang="en-US" smtClean="0"/>
-              <a:t>4/25/22</a:t>
+              <a:t>5/2/22</a:t>
             </a:fld>
             <a:endParaRPr lang="en-US"/>
           </a:p>
@@ -674,7 +679,7 @@
           <a:p>
             <a:fld id="{3C591799-1270-C847-9DB8-0938C79BCDDB}" type="datetimeFigureOut">
               <a:rPr lang="en-US" smtClean="0"/>
-              <a:t>4/25/22</a:t>
+              <a:t>5/2/22</a:t>
             </a:fld>
             <a:endParaRPr lang="en-US"/>
           </a:p>
@@ -844,7 +849,7 @@
           <a:p>
             <a:fld id="{3C591799-1270-C847-9DB8-0938C79BCDDB}" type="datetimeFigureOut">
               <a:rPr lang="en-US" smtClean="0"/>
-              <a:t>4/25/22</a:t>
+              <a:t>5/2/22</a:t>
             </a:fld>
             <a:endParaRPr lang="en-US"/>
           </a:p>
@@ -1024,7 +1029,7 @@
           <a:p>
             <a:fld id="{3C591799-1270-C847-9DB8-0938C79BCDDB}" type="datetimeFigureOut">
               <a:rPr lang="en-US" smtClean="0"/>
-              <a:t>4/25/22</a:t>
+              <a:t>5/2/22</a:t>
             </a:fld>
             <a:endParaRPr lang="en-US"/>
           </a:p>
@@ -1410,7 +1415,7 @@
           <a:p>
             <a:fld id="{3C591799-1270-C847-9DB8-0938C79BCDDB}" type="datetimeFigureOut">
               <a:rPr lang="en-US" smtClean="0"/>
-              <a:t>4/25/22</a:t>
+              <a:t>5/2/22</a:t>
             </a:fld>
             <a:endParaRPr lang="en-US"/>
           </a:p>
@@ -1656,7 +1661,7 @@
           <a:p>
             <a:fld id="{3C591799-1270-C847-9DB8-0938C79BCDDB}" type="datetimeFigureOut">
               <a:rPr lang="en-US" smtClean="0"/>
-              <a:t>4/25/22</a:t>
+              <a:t>5/2/22</a:t>
             </a:fld>
             <a:endParaRPr lang="en-US"/>
           </a:p>
@@ -1888,7 +1893,7 @@
           <a:p>
             <a:fld id="{3C591799-1270-C847-9DB8-0938C79BCDDB}" type="datetimeFigureOut">
               <a:rPr lang="en-US" smtClean="0"/>
-              <a:t>4/25/22</a:t>
+              <a:t>5/2/22</a:t>
             </a:fld>
             <a:endParaRPr lang="en-US"/>
           </a:p>
@@ -2255,7 +2260,7 @@
           <a:p>
             <a:fld id="{3C591799-1270-C847-9DB8-0938C79BCDDB}" type="datetimeFigureOut">
               <a:rPr lang="en-US" smtClean="0"/>
-              <a:t>4/25/22</a:t>
+              <a:t>5/2/22</a:t>
             </a:fld>
             <a:endParaRPr lang="en-US"/>
           </a:p>
@@ -2373,7 +2378,7 @@
           <a:p>
             <a:fld id="{3C591799-1270-C847-9DB8-0938C79BCDDB}" type="datetimeFigureOut">
               <a:rPr lang="en-US" smtClean="0"/>
-              <a:t>4/25/22</a:t>
+              <a:t>5/2/22</a:t>
             </a:fld>
             <a:endParaRPr lang="en-US"/>
           </a:p>
@@ -2468,7 +2473,7 @@
           <a:p>
             <a:fld id="{3C591799-1270-C847-9DB8-0938C79BCDDB}" type="datetimeFigureOut">
               <a:rPr lang="en-US" smtClean="0"/>
-              <a:t>4/25/22</a:t>
+              <a:t>5/2/22</a:t>
             </a:fld>
             <a:endParaRPr lang="en-US"/>
           </a:p>
@@ -2745,7 +2750,7 @@
           <a:p>
             <a:fld id="{3C591799-1270-C847-9DB8-0938C79BCDDB}" type="datetimeFigureOut">
               <a:rPr lang="en-US" smtClean="0"/>
-              <a:t>4/25/22</a:t>
+              <a:t>5/2/22</a:t>
             </a:fld>
             <a:endParaRPr lang="en-US"/>
           </a:p>
@@ -3002,7 +3007,7 @@
           <a:p>
             <a:fld id="{3C591799-1270-C847-9DB8-0938C79BCDDB}" type="datetimeFigureOut">
               <a:rPr lang="en-US" smtClean="0"/>
-              <a:t>4/25/22</a:t>
+              <a:t>5/2/22</a:t>
             </a:fld>
             <a:endParaRPr lang="en-US"/>
           </a:p>
@@ -3215,7 +3220,7 @@
           <a:p>
             <a:fld id="{3C591799-1270-C847-9DB8-0938C79BCDDB}" type="datetimeFigureOut">
               <a:rPr lang="en-US" smtClean="0"/>
-              <a:t>4/25/22</a:t>
+              <a:t>5/2/22</a:t>
             </a:fld>
             <a:endParaRPr lang="en-US"/>
           </a:p>
@@ -4234,7 +4239,7 @@
         </p:blipFill>
         <p:spPr>
           <a:xfrm>
-            <a:off x="9239111" y="344015"/>
+            <a:off x="9418324" y="481052"/>
             <a:ext cx="380036" cy="691494"/>
           </a:xfrm>
           <a:prstGeom prst="rect">
@@ -4374,7 +4379,7 @@
         </p:blipFill>
         <p:spPr>
           <a:xfrm>
-            <a:off x="10184559" y="2466617"/>
+            <a:off x="10184468" y="2413647"/>
             <a:ext cx="380036" cy="691494"/>
           </a:xfrm>
           <a:prstGeom prst="rect">
@@ -4683,7 +4688,7 @@
         </p:nvSpPr>
         <p:spPr>
           <a:xfrm>
-            <a:off x="6631122" y="3191107"/>
+            <a:off x="6746733" y="3171749"/>
             <a:ext cx="777327" cy="123111"/>
           </a:xfrm>
           <a:prstGeom prst="rect">
@@ -4839,7 +4844,7 @@
         </p:nvSpPr>
         <p:spPr>
           <a:xfrm>
-            <a:off x="10137846" y="3317709"/>
+            <a:off x="10113993" y="3243973"/>
             <a:ext cx="777327" cy="153888"/>
           </a:xfrm>
           <a:prstGeom prst="rect">
@@ -4989,8 +4994,8 @@
         </p:nvSpPr>
         <p:spPr>
           <a:xfrm rot="20598841">
-            <a:off x="8187012" y="929883"/>
-            <a:ext cx="1017601" cy="281249"/>
+            <a:off x="8354099" y="1217958"/>
+            <a:ext cx="987596" cy="281249"/>
           </a:xfrm>
           <a:prstGeom prst="rightArrow">
             <a:avLst>
@@ -5047,7 +5052,7 @@
         </p:nvGrpSpPr>
         <p:grpSpPr>
           <a:xfrm>
-            <a:off x="7470092" y="1049508"/>
+            <a:off x="7544350" y="1228533"/>
             <a:ext cx="790164" cy="767570"/>
             <a:chOff x="509984" y="1963"/>
             <a:chExt cx="1974453" cy="1974453"/>
@@ -5156,9 +5161,9 @@
           <p:nvPr/>
         </p:nvSpPr>
         <p:spPr>
-          <a:xfrm rot="10800000">
-            <a:off x="5083989" y="252899"/>
-            <a:ext cx="2127447" cy="252718"/>
+          <a:xfrm rot="6272369">
+            <a:off x="6173814" y="1337446"/>
+            <a:ext cx="1776930" cy="252718"/>
           </a:xfrm>
           <a:prstGeom prst="rightArrow">
             <a:avLst>
@@ -5262,8 +5267,8 @@
         </p:nvSpPr>
         <p:spPr>
           <a:xfrm rot="18112677">
-            <a:off x="6950400" y="1829705"/>
-            <a:ext cx="746966" cy="254346"/>
+            <a:off x="7015974" y="1925617"/>
+            <a:ext cx="691717" cy="254346"/>
           </a:xfrm>
           <a:prstGeom prst="rightArrow">
             <a:avLst>
@@ -5847,8 +5852,8 @@
         </p:nvSpPr>
         <p:spPr>
           <a:xfrm rot="11143838">
-            <a:off x="8225981" y="397724"/>
-            <a:ext cx="926489" cy="258700"/>
+            <a:off x="8225598" y="405348"/>
+            <a:ext cx="1079197" cy="258700"/>
           </a:xfrm>
           <a:prstGeom prst="rightArrow">
             <a:avLst>
@@ -5981,7 +5986,7 @@
         </p:nvSpPr>
         <p:spPr>
           <a:xfrm>
-            <a:off x="8191517" y="2319822"/>
+            <a:off x="8276432" y="2361672"/>
             <a:ext cx="890315" cy="246221"/>
           </a:xfrm>
           <a:prstGeom prst="rect">
@@ -6135,7 +6140,7 @@
         </p:nvSpPr>
         <p:spPr>
           <a:xfrm>
-            <a:off x="8298107" y="3262796"/>
+            <a:off x="8339789" y="3317348"/>
             <a:ext cx="890315" cy="369332"/>
           </a:xfrm>
           <a:prstGeom prst="rect">
@@ -6212,7 +6217,7 @@
         </p:nvSpPr>
         <p:spPr>
           <a:xfrm>
-            <a:off x="7614528" y="1219310"/>
+            <a:off x="7688786" y="1398335"/>
             <a:ext cx="1209418" cy="492443"/>
           </a:xfrm>
           <a:prstGeom prst="rect">
@@ -6972,7 +6977,7 @@
         </p:blipFill>
         <p:spPr>
           <a:xfrm>
-            <a:off x="4588751" y="24687"/>
+            <a:off x="5829236" y="5446500"/>
             <a:ext cx="380036" cy="691494"/>
           </a:xfrm>
           <a:prstGeom prst="rect">
@@ -7048,7 +7053,7 @@
         </p:nvSpPr>
         <p:spPr>
           <a:xfrm>
-            <a:off x="4588751" y="792945"/>
+            <a:off x="5777421" y="6205609"/>
             <a:ext cx="1382276" cy="123111"/>
           </a:xfrm>
           <a:prstGeom prst="rect">
@@ -7102,7 +7107,7 @@
         </p:nvGrpSpPr>
         <p:grpSpPr>
           <a:xfrm>
-            <a:off x="5624172" y="986631"/>
+            <a:off x="6336103" y="4087861"/>
             <a:ext cx="790164" cy="767570"/>
             <a:chOff x="509984" y="1963"/>
             <a:chExt cx="1974453" cy="1974453"/>
@@ -7211,7 +7216,10 @@
                   <a:spcPct val="35000"/>
                 </a:spcAft>
               </a:pPr>
-              <a:endParaRPr lang="en-US" sz="800" kern="1200" dirty="0"/>
+              <a:r>
+                <a:rPr lang="en-US" sz="800" kern="1200" dirty="0"/>
+                <a:t>After Quality Check the Request is sent for Packaging </a:t>
+              </a:r>
             </a:p>
           </p:txBody>
         </p:sp>
@@ -7635,7 +7643,7 @@
         </p:nvSpPr>
         <p:spPr>
           <a:xfrm>
-            <a:off x="9220927" y="1133551"/>
+            <a:off x="9335522" y="1256394"/>
             <a:ext cx="1382276" cy="123111"/>
           </a:xfrm>
           <a:prstGeom prst="rect">
@@ -7783,9 +7791,9 @@
           <p:nvPr/>
         </p:nvSpPr>
         <p:spPr>
-          <a:xfrm rot="14195409">
-            <a:off x="10380330" y="3318466"/>
-            <a:ext cx="1473664" cy="259339"/>
+          <a:xfrm rot="14579529">
+            <a:off x="9168819" y="2383894"/>
+            <a:ext cx="3405621" cy="286327"/>
           </a:xfrm>
           <a:prstGeom prst="rightArrow">
             <a:avLst>
@@ -7940,70 +7948,6 @@
             <a:schemeClr val="lt1"/>
           </a:fontRef>
         </p:style>
-      </p:sp>
-      <p:sp>
-        <p:nvSpPr>
-          <p:cNvPr id="117" name="Right Arrow 116">
-            <a:extLst>
-              <a:ext uri="{FF2B5EF4-FFF2-40B4-BE49-F238E27FC236}">
-                <a16:creationId xmlns:a16="http://schemas.microsoft.com/office/drawing/2014/main" id="{D106ABA9-66DF-ECEC-CF89-546C8B7F6E4A}"/>
-              </a:ext>
-            </a:extLst>
-          </p:cNvPr>
-          <p:cNvSpPr/>
-          <p:nvPr/>
-        </p:nvSpPr>
-        <p:spPr>
-          <a:xfrm rot="9387990">
-            <a:off x="5007949" y="3671585"/>
-            <a:ext cx="2064697" cy="224410"/>
-          </a:xfrm>
-          <a:prstGeom prst="rightArrow">
-            <a:avLst>
-              <a:gd name="adj1" fmla="val 60000"/>
-              <a:gd name="adj2" fmla="val 57023"/>
-            </a:avLst>
-          </a:prstGeom>
-        </p:spPr>
-        <p:style>
-          <a:lnRef idx="0">
-            <a:schemeClr val="accent1">
-              <a:tint val="60000"/>
-              <a:hueOff val="0"/>
-              <a:satOff val="0"/>
-              <a:lumOff val="0"/>
-              <a:alphaOff val="0"/>
-            </a:schemeClr>
-          </a:lnRef>
-          <a:fillRef idx="1">
-            <a:schemeClr val="accent1">
-              <a:tint val="60000"/>
-              <a:hueOff val="0"/>
-              <a:satOff val="0"/>
-              <a:lumOff val="0"/>
-              <a:alphaOff val="0"/>
-            </a:schemeClr>
-          </a:fillRef>
-          <a:effectRef idx="0">
-            <a:schemeClr val="accent1">
-              <a:tint val="60000"/>
-              <a:hueOff val="0"/>
-              <a:satOff val="0"/>
-              <a:lumOff val="0"/>
-              <a:alphaOff val="0"/>
-            </a:schemeClr>
-          </a:effectRef>
-          <a:fontRef idx="minor">
-            <a:schemeClr val="lt1"/>
-          </a:fontRef>
-        </p:style>
-        <p:txBody>
-          <a:bodyPr/>
-          <a:lstStyle/>
-          <a:p>
-            <a:endParaRPr lang="en-US" dirty="0"/>
-          </a:p>
-        </p:txBody>
       </p:sp>
       <p:sp>
         <p:nvSpPr>
@@ -8124,8 +8068,8 @@
         </p:nvSpPr>
         <p:spPr>
           <a:xfrm rot="13083679">
-            <a:off x="767577" y="3793956"/>
-            <a:ext cx="2112738" cy="160141"/>
+            <a:off x="757705" y="3766775"/>
+            <a:ext cx="2043812" cy="215941"/>
           </a:xfrm>
           <a:prstGeom prst="rightArrow">
             <a:avLst>
@@ -8389,8 +8333,8 @@
           <p:nvPr/>
         </p:nvSpPr>
         <p:spPr>
-          <a:xfrm rot="2570272">
-            <a:off x="6228828" y="1864967"/>
+          <a:xfrm rot="13474586">
+            <a:off x="5042328" y="4960895"/>
             <a:ext cx="746966" cy="254346"/>
           </a:xfrm>
           <a:prstGeom prst="rightArrow">
@@ -8446,8 +8390,8 @@
           <p:nvPr/>
         </p:nvSpPr>
         <p:spPr>
-          <a:xfrm rot="1968342">
-            <a:off x="5068810" y="711586"/>
+          <a:xfrm rot="6231782">
+            <a:off x="6562211" y="3590824"/>
             <a:ext cx="746966" cy="254346"/>
           </a:xfrm>
           <a:prstGeom prst="rightArrow">
@@ -8490,6 +8434,63 @@
           </a:fontRef>
         </p:style>
       </p:sp>
+      <p:sp>
+        <p:nvSpPr>
+          <p:cNvPr id="133" name="Right Arrow 132">
+            <a:extLst>
+              <a:ext uri="{FF2B5EF4-FFF2-40B4-BE49-F238E27FC236}">
+                <a16:creationId xmlns:a16="http://schemas.microsoft.com/office/drawing/2014/main" id="{378D8599-4F0D-5C03-D896-D859084D2415}"/>
+              </a:ext>
+            </a:extLst>
+          </p:cNvPr>
+          <p:cNvSpPr/>
+          <p:nvPr/>
+        </p:nvSpPr>
+        <p:spPr>
+          <a:xfrm rot="7633789">
+            <a:off x="6043510" y="4983343"/>
+            <a:ext cx="581877" cy="254346"/>
+          </a:xfrm>
+          <a:prstGeom prst="rightArrow">
+            <a:avLst>
+              <a:gd name="adj1" fmla="val 60000"/>
+              <a:gd name="adj2" fmla="val 57023"/>
+            </a:avLst>
+          </a:prstGeom>
+        </p:spPr>
+        <p:style>
+          <a:lnRef idx="0">
+            <a:schemeClr val="accent1">
+              <a:tint val="60000"/>
+              <a:hueOff val="0"/>
+              <a:satOff val="0"/>
+              <a:lumOff val="0"/>
+              <a:alphaOff val="0"/>
+            </a:schemeClr>
+          </a:lnRef>
+          <a:fillRef idx="1">
+            <a:schemeClr val="accent1">
+              <a:tint val="60000"/>
+              <a:hueOff val="0"/>
+              <a:satOff val="0"/>
+              <a:lumOff val="0"/>
+              <a:alphaOff val="0"/>
+            </a:schemeClr>
+          </a:fillRef>
+          <a:effectRef idx="0">
+            <a:schemeClr val="accent1">
+              <a:tint val="60000"/>
+              <a:hueOff val="0"/>
+              <a:satOff val="0"/>
+              <a:lumOff val="0"/>
+              <a:alphaOff val="0"/>
+            </a:schemeClr>
+          </a:effectRef>
+          <a:fontRef idx="minor">
+            <a:schemeClr val="lt1"/>
+          </a:fontRef>
+        </p:style>
+      </p:sp>
     </p:spTree>
     <p:extLst>
       <p:ext uri="{BB962C8B-B14F-4D97-AF65-F5344CB8AC3E}">
@@ -8500,13 +8501,13 @@
   <p:clrMapOvr>
     <a:masterClrMapping/>
   </p:clrMapOvr>
-  <mc:AlternateContent xmlns:mc="http://schemas.openxmlformats.org/markup-compatibility/2006">
-    <mc:Choice xmlns:p15="http://schemas.microsoft.com/office/powerpoint/2012/main" Requires="p15">
+  <mc:AlternateContent xmlns:mc="http://schemas.openxmlformats.org/markup-compatibility/2006" xmlns:p15="http://schemas.microsoft.com/office/powerpoint/2012/main">
+    <mc:Choice Requires="p15">
       <p:transition xmlns:p14="http://schemas.microsoft.com/office/powerpoint/2010/main" spd="slow" p14:dur="1250">
         <p15:prstTrans prst="airplane"/>
       </p:transition>
     </mc:Choice>
-    <mc:Fallback>
+    <mc:Fallback xmlns="">
       <p:transition spd="slow">
         <p:fade/>
       </p:transition>
@@ -10883,7 +10884,7 @@
                                           </p:stCondLst>
                                         </p:cTn>
                                         <p:tgtEl>
-                                          <p:spTgt spid="117"/>
+                                          <p:spTgt spid="118"/>
                                         </p:tgtEl>
                                         <p:attrNameLst>
                                           <p:attrName>style.visibility</p:attrName>
@@ -10897,7 +10898,7 @@
                                       <p:cBhvr>
                                         <p:cTn id="216" dur="500"/>
                                         <p:tgtEl>
-                                          <p:spTgt spid="117"/>
+                                          <p:spTgt spid="118"/>
                                         </p:tgtEl>
                                       </p:cBhvr>
                                     </p:animEffect>
@@ -10918,7 +10919,7 @@
                                           </p:stCondLst>
                                         </p:cTn>
                                         <p:tgtEl>
-                                          <p:spTgt spid="118"/>
+                                          <p:spTgt spid="95"/>
                                         </p:tgtEl>
                                         <p:attrNameLst>
                                           <p:attrName>style.visibility</p:attrName>
@@ -10931,41 +10932,6 @@
                                     <p:animEffect transition="in" filter="fade">
                                       <p:cBhvr>
                                         <p:cTn id="219" dur="500"/>
-                                        <p:tgtEl>
-                                          <p:spTgt spid="118"/>
-                                        </p:tgtEl>
-                                      </p:cBhvr>
-                                    </p:animEffect>
-                                  </p:childTnLst>
-                                </p:cTn>
-                              </p:par>
-                              <p:par>
-                                <p:cTn id="220" presetID="10" presetClass="entr" presetSubtype="0" fill="hold" nodeType="withEffect">
-                                  <p:stCondLst>
-                                    <p:cond delay="0"/>
-                                  </p:stCondLst>
-                                  <p:childTnLst>
-                                    <p:set>
-                                      <p:cBhvr>
-                                        <p:cTn id="221" dur="1" fill="hold">
-                                          <p:stCondLst>
-                                            <p:cond delay="0"/>
-                                          </p:stCondLst>
-                                        </p:cTn>
-                                        <p:tgtEl>
-                                          <p:spTgt spid="95"/>
-                                        </p:tgtEl>
-                                        <p:attrNameLst>
-                                          <p:attrName>style.visibility</p:attrName>
-                                        </p:attrNameLst>
-                                      </p:cBhvr>
-                                      <p:to>
-                                        <p:strVal val="visible"/>
-                                      </p:to>
-                                    </p:set>
-                                    <p:animEffect transition="in" filter="fade">
-                                      <p:cBhvr>
-                                        <p:cTn id="222" dur="500"/>
                                         <p:tgtEl>
                                           <p:spTgt spid="95"/>
                                         </p:tgtEl>
@@ -10981,32 +10947,67 @@
                     </p:cTn>
                   </p:par>
                   <p:par>
-                    <p:cTn id="223" fill="hold">
+                    <p:cTn id="220" fill="hold">
                       <p:stCondLst>
                         <p:cond delay="indefinite"/>
                       </p:stCondLst>
                       <p:childTnLst>
                         <p:par>
-                          <p:cTn id="224" fill="hold">
+                          <p:cTn id="221" fill="hold">
                             <p:stCondLst>
                               <p:cond delay="0"/>
                             </p:stCondLst>
                             <p:childTnLst>
                               <p:par>
-                                <p:cTn id="225" presetID="10" presetClass="entr" presetSubtype="0" fill="hold" nodeType="clickEffect">
+                                <p:cTn id="222" presetID="10" presetClass="entr" presetSubtype="0" fill="hold" nodeType="clickEffect">
                                   <p:stCondLst>
                                     <p:cond delay="0"/>
                                   </p:stCondLst>
                                   <p:childTnLst>
                                     <p:set>
                                       <p:cBhvr>
+                                        <p:cTn id="223" dur="1" fill="hold">
+                                          <p:stCondLst>
+                                            <p:cond delay="0"/>
+                                          </p:stCondLst>
+                                        </p:cTn>
+                                        <p:tgtEl>
+                                          <p:spTgt spid="96"/>
+                                        </p:tgtEl>
+                                        <p:attrNameLst>
+                                          <p:attrName>style.visibility</p:attrName>
+                                        </p:attrNameLst>
+                                      </p:cBhvr>
+                                      <p:to>
+                                        <p:strVal val="visible"/>
+                                      </p:to>
+                                    </p:set>
+                                    <p:animEffect transition="in" filter="fade">
+                                      <p:cBhvr>
+                                        <p:cTn id="224" dur="500"/>
+                                        <p:tgtEl>
+                                          <p:spTgt spid="96"/>
+                                        </p:tgtEl>
+                                      </p:cBhvr>
+                                    </p:animEffect>
+                                  </p:childTnLst>
+                                </p:cTn>
+                              </p:par>
+                              <p:par>
+                                <p:cTn id="225" presetID="10" presetClass="entr" presetSubtype="0" fill="hold" nodeType="withEffect">
+                                  <p:stCondLst>
+                                    <p:cond delay="0"/>
+                                  </p:stCondLst>
+                                  <p:childTnLst>
+                                    <p:set>
+                                      <p:cBhvr>
                                         <p:cTn id="226" dur="1" fill="hold">
                                           <p:stCondLst>
                                             <p:cond delay="0"/>
                                           </p:stCondLst>
                                         </p:cTn>
                                         <p:tgtEl>
-                                          <p:spTgt spid="96"/>
+                                          <p:spTgt spid="108"/>
                                         </p:tgtEl>
                                         <p:attrNameLst>
                                           <p:attrName>style.visibility</p:attrName>
@@ -11020,7 +11021,7 @@
                                       <p:cBhvr>
                                         <p:cTn id="227" dur="500"/>
                                         <p:tgtEl>
-                                          <p:spTgt spid="96"/>
+                                          <p:spTgt spid="108"/>
                                         </p:tgtEl>
                                       </p:cBhvr>
                                     </p:animEffect>
@@ -11041,7 +11042,7 @@
                                           </p:stCondLst>
                                         </p:cTn>
                                         <p:tgtEl>
-                                          <p:spTgt spid="108"/>
+                                          <p:spTgt spid="109"/>
                                         </p:tgtEl>
                                         <p:attrNameLst>
                                           <p:attrName>style.visibility</p:attrName>
@@ -11055,7 +11056,7 @@
                                       <p:cBhvr>
                                         <p:cTn id="230" dur="500"/>
                                         <p:tgtEl>
-                                          <p:spTgt spid="108"/>
+                                          <p:spTgt spid="109"/>
                                         </p:tgtEl>
                                       </p:cBhvr>
                                     </p:animEffect>
@@ -11076,7 +11077,7 @@
                                           </p:stCondLst>
                                         </p:cTn>
                                         <p:tgtEl>
-                                          <p:spTgt spid="109"/>
+                                          <p:spTgt spid="110"/>
                                         </p:tgtEl>
                                         <p:attrNameLst>
                                           <p:attrName>style.visibility</p:attrName>
@@ -11090,7 +11091,7 @@
                                       <p:cBhvr>
                                         <p:cTn id="233" dur="500"/>
                                         <p:tgtEl>
-                                          <p:spTgt spid="109"/>
+                                          <p:spTgt spid="110"/>
                                         </p:tgtEl>
                                       </p:cBhvr>
                                     </p:animEffect>
@@ -11111,7 +11112,7 @@
                                           </p:stCondLst>
                                         </p:cTn>
                                         <p:tgtEl>
-                                          <p:spTgt spid="110"/>
+                                          <p:spTgt spid="133"/>
                                         </p:tgtEl>
                                         <p:attrNameLst>
                                           <p:attrName>style.visibility</p:attrName>
@@ -11125,7 +11126,7 @@
                                       <p:cBhvr>
                                         <p:cTn id="236" dur="500"/>
                                         <p:tgtEl>
-                                          <p:spTgt spid="110"/>
+                                          <p:spTgt spid="133"/>
                                         </p:tgtEl>
                                       </p:cBhvr>
                                     </p:animEffect>

</xml_diff>